<commit_message>
speakerkit: new logo serli + 4/3
</commit_message>
<xml_diff>
--- a/speakerkit/Slides.pptx
+++ b/speakerkit/Slides.pptx
@@ -2,13 +2,13 @@
 <file path=ppt/presentation.xml><?xml version="1.0" encoding="utf-8"?>
 <p:presentation xmlns:a="http://schemas.openxmlformats.org/drawingml/2006/main" xmlns:r="http://schemas.openxmlformats.org/officeDocument/2006/relationships" xmlns:p="http://schemas.openxmlformats.org/presentationml/2006/main" saveSubsetFonts="1">
   <p:sldMasterIdLst>
-    <p:sldMasterId id="2147483648" r:id="rId1"/>
+    <p:sldMasterId id="2147483660" r:id="rId1"/>
   </p:sldMasterIdLst>
   <p:sldIdLst>
     <p:sldId id="256" r:id="rId2"/>
     <p:sldId id="257" r:id="rId3"/>
   </p:sldIdLst>
-  <p:sldSz cx="12192000" cy="6858000"/>
+  <p:sldSz cx="9144000" cy="6858000" type="screen4x3"/>
   <p:notesSz cx="6858000" cy="9144000"/>
   <p:defaultTextStyle>
     <a:defPPr>
@@ -142,8 +142,8 @@
         </p:nvSpPr>
         <p:spPr>
           <a:xfrm>
-            <a:off x="1524000" y="1122363"/>
-            <a:ext cx="9144000" cy="2387600"/>
+            <a:off x="685800" y="1122363"/>
+            <a:ext cx="7772400" cy="2387600"/>
           </a:xfrm>
         </p:spPr>
         <p:txBody>
@@ -158,7 +158,7 @@
               <a:rPr lang="en-US" smtClean="0"/>
               <a:t>Click to edit Master title style</a:t>
             </a:r>
-            <a:endParaRPr lang="en-US"/>
+            <a:endParaRPr lang="en-US" dirty="0"/>
           </a:p>
         </p:txBody>
       </p:sp>
@@ -174,8 +174,8 @@
         </p:nvSpPr>
         <p:spPr>
           <a:xfrm>
-            <a:off x="1524000" y="3602038"/>
-            <a:ext cx="9144000" cy="1655762"/>
+            <a:off x="1143000" y="3602038"/>
+            <a:ext cx="6858000" cy="1655762"/>
           </a:xfrm>
         </p:spPr>
         <p:txBody>
@@ -223,7 +223,7 @@
               <a:rPr lang="en-US" smtClean="0"/>
               <a:t>Click to edit Master subtitle style</a:t>
             </a:r>
-            <a:endParaRPr lang="en-US"/>
+            <a:endParaRPr lang="en-US" dirty="0"/>
           </a:p>
         </p:txBody>
       </p:sp>
@@ -244,7 +244,7 @@
           <a:p>
             <a:fld id="{B750F7D9-6C5F-4B3E-AFC1-1A2526F28C34}" type="datetimeFigureOut">
               <a:rPr lang="en-US" smtClean="0"/>
-              <a:t>5/9/2014</a:t>
+              <a:t>5/20/2014</a:t>
             </a:fld>
             <a:endParaRPr lang="en-US"/>
           </a:p>
@@ -295,7 +295,7 @@
     </p:spTree>
     <p:extLst>
       <p:ext uri="{BB962C8B-B14F-4D97-AF65-F5344CB8AC3E}">
-        <p14:creationId xmlns:p14="http://schemas.microsoft.com/office/powerpoint/2010/main" val="920606626"/>
+        <p14:creationId xmlns:p14="http://schemas.microsoft.com/office/powerpoint/2010/main" val="3738488583"/>
       </p:ext>
     </p:extLst>
   </p:cSld>
@@ -341,7 +341,7 @@
               <a:rPr lang="en-US" smtClean="0"/>
               <a:t>Click to edit Master title style</a:t>
             </a:r>
-            <a:endParaRPr lang="en-US"/>
+            <a:endParaRPr lang="en-US" dirty="0"/>
           </a:p>
         </p:txBody>
       </p:sp>
@@ -393,7 +393,7 @@
               <a:rPr lang="en-US" smtClean="0"/>
               <a:t>Fifth level</a:t>
             </a:r>
-            <a:endParaRPr lang="en-US"/>
+            <a:endParaRPr lang="en-US" dirty="0"/>
           </a:p>
         </p:txBody>
       </p:sp>
@@ -414,7 +414,7 @@
           <a:p>
             <a:fld id="{B750F7D9-6C5F-4B3E-AFC1-1A2526F28C34}" type="datetimeFigureOut">
               <a:rPr lang="en-US" smtClean="0"/>
-              <a:t>5/9/2014</a:t>
+              <a:t>5/20/2014</a:t>
             </a:fld>
             <a:endParaRPr lang="en-US"/>
           </a:p>
@@ -465,7 +465,7 @@
     </p:spTree>
     <p:extLst>
       <p:ext uri="{BB962C8B-B14F-4D97-AF65-F5344CB8AC3E}">
-        <p14:creationId xmlns:p14="http://schemas.microsoft.com/office/powerpoint/2010/main" val="2793950776"/>
+        <p14:creationId xmlns:p14="http://schemas.microsoft.com/office/powerpoint/2010/main" val="3113174239"/>
       </p:ext>
     </p:extLst>
   </p:cSld>
@@ -504,8 +504,8 @@
         </p:nvSpPr>
         <p:spPr>
           <a:xfrm>
-            <a:off x="8724900" y="365125"/>
-            <a:ext cx="2628900" cy="5811838"/>
+            <a:off x="6543675" y="365125"/>
+            <a:ext cx="1971675" cy="5811838"/>
           </a:xfrm>
         </p:spPr>
         <p:txBody>
@@ -516,7 +516,7 @@
               <a:rPr lang="en-US" smtClean="0"/>
               <a:t>Click to edit Master title style</a:t>
             </a:r>
-            <a:endParaRPr lang="en-US"/>
+            <a:endParaRPr lang="en-US" dirty="0"/>
           </a:p>
         </p:txBody>
       </p:sp>
@@ -532,8 +532,8 @@
         </p:nvSpPr>
         <p:spPr>
           <a:xfrm>
-            <a:off x="838200" y="365125"/>
-            <a:ext cx="7734300" cy="5811838"/>
+            <a:off x="628650" y="365125"/>
+            <a:ext cx="5800725" cy="5811838"/>
           </a:xfrm>
         </p:spPr>
         <p:txBody>
@@ -573,7 +573,7 @@
               <a:rPr lang="en-US" smtClean="0"/>
               <a:t>Fifth level</a:t>
             </a:r>
-            <a:endParaRPr lang="en-US"/>
+            <a:endParaRPr lang="en-US" dirty="0"/>
           </a:p>
         </p:txBody>
       </p:sp>
@@ -594,7 +594,7 @@
           <a:p>
             <a:fld id="{B750F7D9-6C5F-4B3E-AFC1-1A2526F28C34}" type="datetimeFigureOut">
               <a:rPr lang="en-US" smtClean="0"/>
-              <a:t>5/9/2014</a:t>
+              <a:t>5/20/2014</a:t>
             </a:fld>
             <a:endParaRPr lang="en-US"/>
           </a:p>
@@ -645,7 +645,7 @@
     </p:spTree>
     <p:extLst>
       <p:ext uri="{BB962C8B-B14F-4D97-AF65-F5344CB8AC3E}">
-        <p14:creationId xmlns:p14="http://schemas.microsoft.com/office/powerpoint/2010/main" val="1439135264"/>
+        <p14:creationId xmlns:p14="http://schemas.microsoft.com/office/powerpoint/2010/main" val="2691053355"/>
       </p:ext>
     </p:extLst>
   </p:cSld>
@@ -691,7 +691,7 @@
               <a:rPr lang="en-US" smtClean="0"/>
               <a:t>Click to edit Master title style</a:t>
             </a:r>
-            <a:endParaRPr lang="en-US"/>
+            <a:endParaRPr lang="en-US" dirty="0"/>
           </a:p>
         </p:txBody>
       </p:sp>
@@ -743,7 +743,7 @@
               <a:rPr lang="en-US" smtClean="0"/>
               <a:t>Fifth level</a:t>
             </a:r>
-            <a:endParaRPr lang="en-US"/>
+            <a:endParaRPr lang="en-US" dirty="0"/>
           </a:p>
         </p:txBody>
       </p:sp>
@@ -764,7 +764,7 @@
           <a:p>
             <a:fld id="{B750F7D9-6C5F-4B3E-AFC1-1A2526F28C34}" type="datetimeFigureOut">
               <a:rPr lang="en-US" smtClean="0"/>
-              <a:t>5/9/2014</a:t>
+              <a:t>5/20/2014</a:t>
             </a:fld>
             <a:endParaRPr lang="en-US"/>
           </a:p>
@@ -815,7 +815,7 @@
     </p:spTree>
     <p:extLst>
       <p:ext uri="{BB962C8B-B14F-4D97-AF65-F5344CB8AC3E}">
-        <p14:creationId xmlns:p14="http://schemas.microsoft.com/office/powerpoint/2010/main" val="2210358122"/>
+        <p14:creationId xmlns:p14="http://schemas.microsoft.com/office/powerpoint/2010/main" val="516238484"/>
       </p:ext>
     </p:extLst>
   </p:cSld>
@@ -854,8 +854,8 @@
         </p:nvSpPr>
         <p:spPr>
           <a:xfrm>
-            <a:off x="831850" y="1709738"/>
-            <a:ext cx="10515600" cy="2852737"/>
+            <a:off x="623888" y="1709739"/>
+            <a:ext cx="7886700" cy="2852737"/>
           </a:xfrm>
         </p:spPr>
         <p:txBody>
@@ -870,7 +870,7 @@
               <a:rPr lang="en-US" smtClean="0"/>
               <a:t>Click to edit Master title style</a:t>
             </a:r>
-            <a:endParaRPr lang="en-US"/>
+            <a:endParaRPr lang="en-US" dirty="0"/>
           </a:p>
         </p:txBody>
       </p:sp>
@@ -886,8 +886,8 @@
         </p:nvSpPr>
         <p:spPr>
           <a:xfrm>
-            <a:off x="831850" y="4589463"/>
-            <a:ext cx="10515600" cy="1500187"/>
+            <a:off x="623888" y="4589464"/>
+            <a:ext cx="7886700" cy="1500187"/>
           </a:xfrm>
         </p:spPr>
         <p:txBody>
@@ -897,9 +897,7 @@
               <a:buNone/>
               <a:defRPr sz="2400">
                 <a:solidFill>
-                  <a:schemeClr val="tx1">
-                    <a:tint val="75000"/>
-                  </a:schemeClr>
+                  <a:schemeClr val="tx1"/>
                 </a:solidFill>
               </a:defRPr>
             </a:lvl1pPr>
@@ -1010,7 +1008,7 @@
           <a:p>
             <a:fld id="{B750F7D9-6C5F-4B3E-AFC1-1A2526F28C34}" type="datetimeFigureOut">
               <a:rPr lang="en-US" smtClean="0"/>
-              <a:t>5/9/2014</a:t>
+              <a:t>5/20/2014</a:t>
             </a:fld>
             <a:endParaRPr lang="en-US"/>
           </a:p>
@@ -1061,7 +1059,7 @@
     </p:spTree>
     <p:extLst>
       <p:ext uri="{BB962C8B-B14F-4D97-AF65-F5344CB8AC3E}">
-        <p14:creationId xmlns:p14="http://schemas.microsoft.com/office/powerpoint/2010/main" val="2097882714"/>
+        <p14:creationId xmlns:p14="http://schemas.microsoft.com/office/powerpoint/2010/main" val="87669597"/>
       </p:ext>
     </p:extLst>
   </p:cSld>
@@ -1107,7 +1105,7 @@
               <a:rPr lang="en-US" smtClean="0"/>
               <a:t>Click to edit Master title style</a:t>
             </a:r>
-            <a:endParaRPr lang="en-US"/>
+            <a:endParaRPr lang="en-US" dirty="0"/>
           </a:p>
         </p:txBody>
       </p:sp>
@@ -1123,8 +1121,8 @@
         </p:nvSpPr>
         <p:spPr>
           <a:xfrm>
-            <a:off x="838200" y="1825625"/>
-            <a:ext cx="5181600" cy="4351338"/>
+            <a:off x="628650" y="1825625"/>
+            <a:ext cx="3886200" cy="4351338"/>
           </a:xfrm>
         </p:spPr>
         <p:txBody>
@@ -1164,7 +1162,7 @@
               <a:rPr lang="en-US" smtClean="0"/>
               <a:t>Fifth level</a:t>
             </a:r>
-            <a:endParaRPr lang="en-US"/>
+            <a:endParaRPr lang="en-US" dirty="0"/>
           </a:p>
         </p:txBody>
       </p:sp>
@@ -1180,8 +1178,8 @@
         </p:nvSpPr>
         <p:spPr>
           <a:xfrm>
-            <a:off x="6172200" y="1825625"/>
-            <a:ext cx="5181600" cy="4351338"/>
+            <a:off x="4629150" y="1825625"/>
+            <a:ext cx="3886200" cy="4351338"/>
           </a:xfrm>
         </p:spPr>
         <p:txBody>
@@ -1221,7 +1219,7 @@
               <a:rPr lang="en-US" smtClean="0"/>
               <a:t>Fifth level</a:t>
             </a:r>
-            <a:endParaRPr lang="en-US"/>
+            <a:endParaRPr lang="en-US" dirty="0"/>
           </a:p>
         </p:txBody>
       </p:sp>
@@ -1242,7 +1240,7 @@
           <a:p>
             <a:fld id="{B750F7D9-6C5F-4B3E-AFC1-1A2526F28C34}" type="datetimeFigureOut">
               <a:rPr lang="en-US" smtClean="0"/>
-              <a:t>5/9/2014</a:t>
+              <a:t>5/20/2014</a:t>
             </a:fld>
             <a:endParaRPr lang="en-US"/>
           </a:p>
@@ -1293,7 +1291,7 @@
     </p:spTree>
     <p:extLst>
       <p:ext uri="{BB962C8B-B14F-4D97-AF65-F5344CB8AC3E}">
-        <p14:creationId xmlns:p14="http://schemas.microsoft.com/office/powerpoint/2010/main" val="4021937249"/>
+        <p14:creationId xmlns:p14="http://schemas.microsoft.com/office/powerpoint/2010/main" val="38069597"/>
       </p:ext>
     </p:extLst>
   </p:cSld>
@@ -1332,8 +1330,8 @@
         </p:nvSpPr>
         <p:spPr>
           <a:xfrm>
-            <a:off x="839788" y="365125"/>
-            <a:ext cx="10515600" cy="1325563"/>
+            <a:off x="629841" y="365126"/>
+            <a:ext cx="7886700" cy="1325563"/>
           </a:xfrm>
         </p:spPr>
         <p:txBody>
@@ -1344,7 +1342,7 @@
               <a:rPr lang="en-US" smtClean="0"/>
               <a:t>Click to edit Master title style</a:t>
             </a:r>
-            <a:endParaRPr lang="en-US"/>
+            <a:endParaRPr lang="en-US" dirty="0"/>
           </a:p>
         </p:txBody>
       </p:sp>
@@ -1360,8 +1358,8 @@
         </p:nvSpPr>
         <p:spPr>
           <a:xfrm>
-            <a:off x="839788" y="1681163"/>
-            <a:ext cx="5157787" cy="823912"/>
+            <a:off x="629842" y="1681163"/>
+            <a:ext cx="3868340" cy="823912"/>
           </a:xfrm>
         </p:spPr>
         <p:txBody>
@@ -1425,8 +1423,8 @@
         </p:nvSpPr>
         <p:spPr>
           <a:xfrm>
-            <a:off x="839788" y="2505075"/>
-            <a:ext cx="5157787" cy="3684588"/>
+            <a:off x="629842" y="2505075"/>
+            <a:ext cx="3868340" cy="3684588"/>
           </a:xfrm>
         </p:spPr>
         <p:txBody>
@@ -1466,7 +1464,7 @@
               <a:rPr lang="en-US" smtClean="0"/>
               <a:t>Fifth level</a:t>
             </a:r>
-            <a:endParaRPr lang="en-US"/>
+            <a:endParaRPr lang="en-US" dirty="0"/>
           </a:p>
         </p:txBody>
       </p:sp>
@@ -1482,8 +1480,8 @@
         </p:nvSpPr>
         <p:spPr>
           <a:xfrm>
-            <a:off x="6172200" y="1681163"/>
-            <a:ext cx="5183188" cy="823912"/>
+            <a:off x="4629150" y="1681163"/>
+            <a:ext cx="3887391" cy="823912"/>
           </a:xfrm>
         </p:spPr>
         <p:txBody>
@@ -1547,8 +1545,8 @@
         </p:nvSpPr>
         <p:spPr>
           <a:xfrm>
-            <a:off x="6172200" y="2505075"/>
-            <a:ext cx="5183188" cy="3684588"/>
+            <a:off x="4629150" y="2505075"/>
+            <a:ext cx="3887391" cy="3684588"/>
           </a:xfrm>
         </p:spPr>
         <p:txBody>
@@ -1588,7 +1586,7 @@
               <a:rPr lang="en-US" smtClean="0"/>
               <a:t>Fifth level</a:t>
             </a:r>
-            <a:endParaRPr lang="en-US"/>
+            <a:endParaRPr lang="en-US" dirty="0"/>
           </a:p>
         </p:txBody>
       </p:sp>
@@ -1609,7 +1607,7 @@
           <a:p>
             <a:fld id="{B750F7D9-6C5F-4B3E-AFC1-1A2526F28C34}" type="datetimeFigureOut">
               <a:rPr lang="en-US" smtClean="0"/>
-              <a:t>5/9/2014</a:t>
+              <a:t>5/20/2014</a:t>
             </a:fld>
             <a:endParaRPr lang="en-US"/>
           </a:p>
@@ -1660,7 +1658,7 @@
     </p:spTree>
     <p:extLst>
       <p:ext uri="{BB962C8B-B14F-4D97-AF65-F5344CB8AC3E}">
-        <p14:creationId xmlns:p14="http://schemas.microsoft.com/office/powerpoint/2010/main" val="2178258327"/>
+        <p14:creationId xmlns:p14="http://schemas.microsoft.com/office/powerpoint/2010/main" val="2962796543"/>
       </p:ext>
     </p:extLst>
   </p:cSld>
@@ -1706,7 +1704,7 @@
               <a:rPr lang="en-US" smtClean="0"/>
               <a:t>Click to edit Master title style</a:t>
             </a:r>
-            <a:endParaRPr lang="en-US"/>
+            <a:endParaRPr lang="en-US" dirty="0"/>
           </a:p>
         </p:txBody>
       </p:sp>
@@ -1727,7 +1725,7 @@
           <a:p>
             <a:fld id="{B750F7D9-6C5F-4B3E-AFC1-1A2526F28C34}" type="datetimeFigureOut">
               <a:rPr lang="en-US" smtClean="0"/>
-              <a:t>5/9/2014</a:t>
+              <a:t>5/20/2014</a:t>
             </a:fld>
             <a:endParaRPr lang="en-US"/>
           </a:p>
@@ -1778,7 +1776,7 @@
     </p:spTree>
     <p:extLst>
       <p:ext uri="{BB962C8B-B14F-4D97-AF65-F5344CB8AC3E}">
-        <p14:creationId xmlns:p14="http://schemas.microsoft.com/office/powerpoint/2010/main" val="1189194338"/>
+        <p14:creationId xmlns:p14="http://schemas.microsoft.com/office/powerpoint/2010/main" val="2087797455"/>
       </p:ext>
     </p:extLst>
   </p:cSld>
@@ -1822,7 +1820,7 @@
           <a:p>
             <a:fld id="{B750F7D9-6C5F-4B3E-AFC1-1A2526F28C34}" type="datetimeFigureOut">
               <a:rPr lang="en-US" smtClean="0"/>
-              <a:t>5/9/2014</a:t>
+              <a:t>5/20/2014</a:t>
             </a:fld>
             <a:endParaRPr lang="en-US"/>
           </a:p>
@@ -1873,7 +1871,7 @@
     </p:spTree>
     <p:extLst>
       <p:ext uri="{BB962C8B-B14F-4D97-AF65-F5344CB8AC3E}">
-        <p14:creationId xmlns:p14="http://schemas.microsoft.com/office/powerpoint/2010/main" val="3988879663"/>
+        <p14:creationId xmlns:p14="http://schemas.microsoft.com/office/powerpoint/2010/main" val="2920580251"/>
       </p:ext>
     </p:extLst>
   </p:cSld>
@@ -1912,8 +1910,8 @@
         </p:nvSpPr>
         <p:spPr>
           <a:xfrm>
-            <a:off x="839788" y="457200"/>
-            <a:ext cx="3932237" cy="1600200"/>
+            <a:off x="629841" y="457200"/>
+            <a:ext cx="2949178" cy="1600200"/>
           </a:xfrm>
         </p:spPr>
         <p:txBody>
@@ -1928,7 +1926,7 @@
               <a:rPr lang="en-US" smtClean="0"/>
               <a:t>Click to edit Master title style</a:t>
             </a:r>
-            <a:endParaRPr lang="en-US"/>
+            <a:endParaRPr lang="en-US" dirty="0"/>
           </a:p>
         </p:txBody>
       </p:sp>
@@ -1944,8 +1942,8 @@
         </p:nvSpPr>
         <p:spPr>
           <a:xfrm>
-            <a:off x="5183188" y="987425"/>
-            <a:ext cx="6172200" cy="4873625"/>
+            <a:off x="3887391" y="987426"/>
+            <a:ext cx="4629150" cy="4873625"/>
           </a:xfrm>
         </p:spPr>
         <p:txBody>
@@ -2013,7 +2011,7 @@
               <a:rPr lang="en-US" smtClean="0"/>
               <a:t>Fifth level</a:t>
             </a:r>
-            <a:endParaRPr lang="en-US"/>
+            <a:endParaRPr lang="en-US" dirty="0"/>
           </a:p>
         </p:txBody>
       </p:sp>
@@ -2029,8 +2027,8 @@
         </p:nvSpPr>
         <p:spPr>
           <a:xfrm>
-            <a:off x="839788" y="2057400"/>
-            <a:ext cx="3932237" cy="3811588"/>
+            <a:off x="629841" y="2057400"/>
+            <a:ext cx="2949178" cy="3811588"/>
           </a:xfrm>
         </p:spPr>
         <p:txBody>
@@ -2099,7 +2097,7 @@
           <a:p>
             <a:fld id="{B750F7D9-6C5F-4B3E-AFC1-1A2526F28C34}" type="datetimeFigureOut">
               <a:rPr lang="en-US" smtClean="0"/>
-              <a:t>5/9/2014</a:t>
+              <a:t>5/20/2014</a:t>
             </a:fld>
             <a:endParaRPr lang="en-US"/>
           </a:p>
@@ -2150,7 +2148,7 @@
     </p:spTree>
     <p:extLst>
       <p:ext uri="{BB962C8B-B14F-4D97-AF65-F5344CB8AC3E}">
-        <p14:creationId xmlns:p14="http://schemas.microsoft.com/office/powerpoint/2010/main" val="2655344434"/>
+        <p14:creationId xmlns:p14="http://schemas.microsoft.com/office/powerpoint/2010/main" val="3399188301"/>
       </p:ext>
     </p:extLst>
   </p:cSld>
@@ -2189,8 +2187,8 @@
         </p:nvSpPr>
         <p:spPr>
           <a:xfrm>
-            <a:off x="839788" y="457200"/>
-            <a:ext cx="3932237" cy="1600200"/>
+            <a:off x="629841" y="457200"/>
+            <a:ext cx="2949178" cy="1600200"/>
           </a:xfrm>
         </p:spPr>
         <p:txBody>
@@ -2205,7 +2203,7 @@
               <a:rPr lang="en-US" smtClean="0"/>
               <a:t>Click to edit Master title style</a:t>
             </a:r>
-            <a:endParaRPr lang="en-US"/>
+            <a:endParaRPr lang="en-US" dirty="0"/>
           </a:p>
         </p:txBody>
       </p:sp>
@@ -2213,7 +2211,7 @@
         <p:nvSpPr>
           <p:cNvPr id="3" name="Picture Placeholder 2"/>
           <p:cNvSpPr>
-            <a:spLocks noGrp="1"/>
+            <a:spLocks noGrp="1" noChangeAspect="1"/>
           </p:cNvSpPr>
           <p:nvPr>
             <p:ph type="pic" idx="1"/>
@@ -2221,12 +2219,12 @@
         </p:nvSpPr>
         <p:spPr>
           <a:xfrm>
-            <a:off x="5183188" y="987425"/>
-            <a:ext cx="6172200" cy="4873625"/>
+            <a:off x="3887391" y="987426"/>
+            <a:ext cx="4629150" cy="4873625"/>
           </a:xfrm>
         </p:spPr>
         <p:txBody>
-          <a:bodyPr/>
+          <a:bodyPr anchor="t"/>
           <a:lstStyle>
             <a:lvl1pPr marL="0" indent="0">
               <a:buNone/>
@@ -2266,7 +2264,11 @@
             </a:lvl9pPr>
           </a:lstStyle>
           <a:p>
-            <a:endParaRPr lang="en-US"/>
+            <a:r>
+              <a:rPr lang="en-US" smtClean="0"/>
+              <a:t>Click icon to add picture</a:t>
+            </a:r>
+            <a:endParaRPr lang="en-US" dirty="0"/>
           </a:p>
         </p:txBody>
       </p:sp>
@@ -2282,8 +2284,8 @@
         </p:nvSpPr>
         <p:spPr>
           <a:xfrm>
-            <a:off x="839788" y="2057400"/>
-            <a:ext cx="3932237" cy="3811588"/>
+            <a:off x="629841" y="2057400"/>
+            <a:ext cx="2949178" cy="3811588"/>
           </a:xfrm>
         </p:spPr>
         <p:txBody>
@@ -2352,7 +2354,7 @@
           <a:p>
             <a:fld id="{B750F7D9-6C5F-4B3E-AFC1-1A2526F28C34}" type="datetimeFigureOut">
               <a:rPr lang="en-US" smtClean="0"/>
-              <a:t>5/9/2014</a:t>
+              <a:t>5/20/2014</a:t>
             </a:fld>
             <a:endParaRPr lang="en-US"/>
           </a:p>
@@ -2403,7 +2405,7 @@
     </p:spTree>
     <p:extLst>
       <p:ext uri="{BB962C8B-B14F-4D97-AF65-F5344CB8AC3E}">
-        <p14:creationId xmlns:p14="http://schemas.microsoft.com/office/powerpoint/2010/main" val="2310521608"/>
+        <p14:creationId xmlns:p14="http://schemas.microsoft.com/office/powerpoint/2010/main" val="3352412009"/>
       </p:ext>
     </p:extLst>
   </p:cSld>
@@ -2447,8 +2449,8 @@
         </p:nvSpPr>
         <p:spPr>
           <a:xfrm>
-            <a:off x="838200" y="365125"/>
-            <a:ext cx="10515600" cy="1325563"/>
+            <a:off x="628650" y="365126"/>
+            <a:ext cx="7886700" cy="1325563"/>
           </a:xfrm>
           <a:prstGeom prst="rect">
             <a:avLst/>
@@ -2464,7 +2466,7 @@
               <a:rPr lang="en-US" smtClean="0"/>
               <a:t>Click to edit Master title style</a:t>
             </a:r>
-            <a:endParaRPr lang="en-US"/>
+            <a:endParaRPr lang="en-US" dirty="0"/>
           </a:p>
         </p:txBody>
       </p:sp>
@@ -2480,8 +2482,8 @@
         </p:nvSpPr>
         <p:spPr>
           <a:xfrm>
-            <a:off x="838200" y="1825625"/>
-            <a:ext cx="10515600" cy="4351338"/>
+            <a:off x="628650" y="1825625"/>
+            <a:ext cx="7886700" cy="4351338"/>
           </a:xfrm>
           <a:prstGeom prst="rect">
             <a:avLst/>
@@ -2526,7 +2528,7 @@
               <a:rPr lang="en-US" smtClean="0"/>
               <a:t>Fifth level</a:t>
             </a:r>
-            <a:endParaRPr lang="en-US"/>
+            <a:endParaRPr lang="en-US" dirty="0"/>
           </a:p>
         </p:txBody>
       </p:sp>
@@ -2542,8 +2544,8 @@
         </p:nvSpPr>
         <p:spPr>
           <a:xfrm>
-            <a:off x="838200" y="6356350"/>
-            <a:ext cx="2743200" cy="365125"/>
+            <a:off x="628650" y="6356351"/>
+            <a:ext cx="2057400" cy="365125"/>
           </a:xfrm>
           <a:prstGeom prst="rect">
             <a:avLst/>
@@ -2565,7 +2567,7 @@
           <a:p>
             <a:fld id="{B750F7D9-6C5F-4B3E-AFC1-1A2526F28C34}" type="datetimeFigureOut">
               <a:rPr lang="en-US" smtClean="0"/>
-              <a:t>5/9/2014</a:t>
+              <a:t>5/20/2014</a:t>
             </a:fld>
             <a:endParaRPr lang="en-US"/>
           </a:p>
@@ -2583,8 +2585,8 @@
         </p:nvSpPr>
         <p:spPr>
           <a:xfrm>
-            <a:off x="4038600" y="6356350"/>
-            <a:ext cx="4114800" cy="365125"/>
+            <a:off x="3028950" y="6356351"/>
+            <a:ext cx="3086100" cy="365125"/>
           </a:xfrm>
           <a:prstGeom prst="rect">
             <a:avLst/>
@@ -2620,8 +2622,8 @@
         </p:nvSpPr>
         <p:spPr>
           <a:xfrm>
-            <a:off x="8610600" y="6356350"/>
-            <a:ext cx="2743200" cy="365125"/>
+            <a:off x="6457950" y="6356351"/>
+            <a:ext cx="2057400" cy="365125"/>
           </a:xfrm>
           <a:prstGeom prst="rect">
             <a:avLst/>
@@ -2652,23 +2654,23 @@
     </p:spTree>
     <p:extLst>
       <p:ext uri="{BB962C8B-B14F-4D97-AF65-F5344CB8AC3E}">
-        <p14:creationId xmlns:p14="http://schemas.microsoft.com/office/powerpoint/2010/main" val="1938546399"/>
+        <p14:creationId xmlns:p14="http://schemas.microsoft.com/office/powerpoint/2010/main" val="4106438023"/>
       </p:ext>
     </p:extLst>
   </p:cSld>
   <p:clrMap bg1="lt1" tx1="dk1" bg2="lt2" tx2="dk2" accent1="accent1" accent2="accent2" accent3="accent3" accent4="accent4" accent5="accent5" accent6="accent6" hlink="hlink" folHlink="folHlink"/>
   <p:sldLayoutIdLst>
-    <p:sldLayoutId id="2147483649" r:id="rId1"/>
-    <p:sldLayoutId id="2147483650" r:id="rId2"/>
-    <p:sldLayoutId id="2147483651" r:id="rId3"/>
-    <p:sldLayoutId id="2147483652" r:id="rId4"/>
-    <p:sldLayoutId id="2147483653" r:id="rId5"/>
-    <p:sldLayoutId id="2147483654" r:id="rId6"/>
-    <p:sldLayoutId id="2147483655" r:id="rId7"/>
-    <p:sldLayoutId id="2147483656" r:id="rId8"/>
-    <p:sldLayoutId id="2147483657" r:id="rId9"/>
-    <p:sldLayoutId id="2147483658" r:id="rId10"/>
-    <p:sldLayoutId id="2147483659" r:id="rId11"/>
+    <p:sldLayoutId id="2147483661" r:id="rId1"/>
+    <p:sldLayoutId id="2147483662" r:id="rId2"/>
+    <p:sldLayoutId id="2147483663" r:id="rId3"/>
+    <p:sldLayoutId id="2147483664" r:id="rId4"/>
+    <p:sldLayoutId id="2147483665" r:id="rId5"/>
+    <p:sldLayoutId id="2147483666" r:id="rId6"/>
+    <p:sldLayoutId id="2147483667" r:id="rId7"/>
+    <p:sldLayoutId id="2147483668" r:id="rId8"/>
+    <p:sldLayoutId id="2147483669" r:id="rId9"/>
+    <p:sldLayoutId id="2147483670" r:id="rId10"/>
+    <p:sldLayoutId id="2147483671" r:id="rId11"/>
   </p:sldLayoutIdLst>
   <p:txStyles>
     <p:titleStyle>
@@ -2970,97 +2972,30 @@
           <a:chExt cx="0" cy="0"/>
         </a:xfrm>
       </p:grpSpPr>
-      <p:sp>
-        <p:nvSpPr>
-          <p:cNvPr id="2" name="Title 1"/>
-          <p:cNvSpPr>
-            <a:spLocks noGrp="1"/>
-          </p:cNvSpPr>
-          <p:nvPr>
-            <p:ph type="ctrTitle"/>
-          </p:nvPr>
-        </p:nvSpPr>
-        <p:spPr>
-          <a:xfrm>
-            <a:off x="1937397" y="1122363"/>
-            <a:ext cx="8317206" cy="2387600"/>
-          </a:xfrm>
-        </p:spPr>
-        <p:txBody>
-          <a:bodyPr/>
-          <a:lstStyle/>
-          <a:p>
-            <a:r>
-              <a:rPr lang="fr-FR" dirty="0" smtClean="0"/>
-              <a:t>Notre sujet </a:t>
-            </a:r>
-            <a:r>
-              <a:rPr lang="fr-FR" smtClean="0"/>
-              <a:t>super </a:t>
-            </a:r>
-            <a:r>
-              <a:rPr lang="fr-FR" smtClean="0"/>
-              <a:t>intéressant</a:t>
-            </a:r>
-            <a:endParaRPr lang="en-US" dirty="0"/>
-          </a:p>
-        </p:txBody>
-      </p:sp>
-      <p:sp>
-        <p:nvSpPr>
-          <p:cNvPr id="3" name="Subtitle 2"/>
-          <p:cNvSpPr>
-            <a:spLocks noGrp="1"/>
-          </p:cNvSpPr>
-          <p:nvPr>
-            <p:ph type="subTitle" idx="1"/>
-          </p:nvPr>
-        </p:nvSpPr>
-        <p:spPr/>
-        <p:txBody>
-          <a:bodyPr/>
-          <a:lstStyle/>
-          <a:p>
-            <a:r>
-              <a:rPr lang="fr-FR" dirty="0" smtClean="0"/>
-              <a:t>John Dupont − </a:t>
-            </a:r>
-            <a:r>
-              <a:rPr lang="fr-FR" dirty="0" err="1" smtClean="0"/>
-              <a:t>Big</a:t>
-            </a:r>
-            <a:r>
-              <a:rPr lang="fr-FR" dirty="0" smtClean="0"/>
-              <a:t> Corporation</a:t>
-            </a:r>
-          </a:p>
-          <a:p>
-            <a:r>
-              <a:rPr lang="fr-FR" dirty="0" smtClean="0"/>
-              <a:t>John Dupond − Ma petite entreprise</a:t>
-            </a:r>
-            <a:endParaRPr lang="en-US" dirty="0"/>
-          </a:p>
-        </p:txBody>
-      </p:sp>
       <p:pic>
         <p:nvPicPr>
-          <p:cNvPr id="9" name="Picture 8"/>
+          <p:cNvPr id="5" name="Picture 4"/>
           <p:cNvPicPr>
             <a:picLocks noChangeAspect="1"/>
           </p:cNvPicPr>
           <p:nvPr/>
         </p:nvPicPr>
         <p:blipFill>
-          <a:blip r:embed="rId2"/>
+          <a:blip r:embed="rId2" cstate="print">
+            <a:extLst>
+              <a:ext uri="{28A0092B-C50C-407E-A947-70E740481C1C}">
+                <a14:useLocalDpi xmlns:a14="http://schemas.microsoft.com/office/drawing/2010/main" val="0"/>
+              </a:ext>
+            </a:extLst>
+          </a:blip>
           <a:stretch>
             <a:fillRect/>
           </a:stretch>
         </p:blipFill>
         <p:spPr>
           <a:xfrm>
-            <a:off x="2002992" y="5486400"/>
-            <a:ext cx="8186016" cy="1371600"/>
+            <a:off x="1019715" y="5667601"/>
+            <a:ext cx="7104571" cy="1190399"/>
           </a:xfrm>
           <a:prstGeom prst="rect">
             <a:avLst/>
@@ -3076,7 +3011,7 @@
           <p:nvPr/>
         </p:nvPicPr>
         <p:blipFill>
-          <a:blip r:embed="rId3">
+          <a:blip r:embed="rId3" cstate="print">
             <a:extLst>
               <a:ext uri="{28A0092B-C50C-407E-A947-70E740481C1C}">
                 <a14:useLocalDpi xmlns:a14="http://schemas.microsoft.com/office/drawing/2010/main" val="0"/>
@@ -3089,14 +3024,83 @@
         </p:blipFill>
         <p:spPr>
           <a:xfrm>
-            <a:off x="9256872" y="1096905"/>
-            <a:ext cx="3831537" cy="4160895"/>
+            <a:off x="6338607" y="1570788"/>
+            <a:ext cx="3571357" cy="3878350"/>
           </a:xfrm>
           <a:prstGeom prst="rect">
             <a:avLst/>
           </a:prstGeom>
         </p:spPr>
       </p:pic>
+      <p:sp>
+        <p:nvSpPr>
+          <p:cNvPr id="2" name="Title 1"/>
+          <p:cNvSpPr>
+            <a:spLocks noGrp="1"/>
+          </p:cNvSpPr>
+          <p:nvPr>
+            <p:ph type="ctrTitle"/>
+          </p:nvPr>
+        </p:nvSpPr>
+        <p:spPr>
+          <a:xfrm>
+            <a:off x="413397" y="1122363"/>
+            <a:ext cx="8317206" cy="2387600"/>
+          </a:xfrm>
+        </p:spPr>
+        <p:txBody>
+          <a:bodyPr/>
+          <a:lstStyle/>
+          <a:p>
+            <a:r>
+              <a:rPr lang="fr-FR" dirty="0" smtClean="0"/>
+              <a:t>Notre sujet </a:t>
+            </a:r>
+            <a:r>
+              <a:rPr lang="fr-FR" smtClean="0"/>
+              <a:t>super intéressant</a:t>
+            </a:r>
+            <a:endParaRPr lang="en-US" dirty="0"/>
+          </a:p>
+        </p:txBody>
+      </p:sp>
+      <p:sp>
+        <p:nvSpPr>
+          <p:cNvPr id="3" name="Subtitle 2"/>
+          <p:cNvSpPr>
+            <a:spLocks noGrp="1"/>
+          </p:cNvSpPr>
+          <p:nvPr>
+            <p:ph type="subTitle" idx="1"/>
+          </p:nvPr>
+        </p:nvSpPr>
+        <p:spPr/>
+        <p:txBody>
+          <a:bodyPr/>
+          <a:lstStyle/>
+          <a:p>
+            <a:r>
+              <a:rPr lang="fr-FR" dirty="0" smtClean="0"/>
+              <a:t>John Dupont − </a:t>
+            </a:r>
+            <a:r>
+              <a:rPr lang="fr-FR" dirty="0" err="1" smtClean="0"/>
+              <a:t>Big</a:t>
+            </a:r>
+            <a:r>
+              <a:rPr lang="fr-FR" dirty="0" smtClean="0"/>
+              <a:t> Corporation</a:t>
+            </a:r>
+          </a:p>
+          <a:p>
+            <a:r>
+              <a:rPr lang="fr-FR" dirty="0" smtClean="0"/>
+              <a:t>John Dupond − Ma petite entreprise</a:t>
+            </a:r>
+            <a:endParaRPr lang="en-US" dirty="0"/>
+          </a:p>
+        </p:txBody>
+      </p:sp>
       <p:pic>
         <p:nvPicPr>
           <p:cNvPr id="4" name="Picture 3"/>
@@ -3106,7 +3110,7 @@
           <p:nvPr/>
         </p:nvPicPr>
         <p:blipFill>
-          <a:blip r:embed="rId4">
+          <a:blip r:embed="rId4" cstate="print">
             <a:extLst>
               <a:ext uri="{28A0092B-C50C-407E-A947-70E740481C1C}">
                 <a14:useLocalDpi xmlns:a14="http://schemas.microsoft.com/office/drawing/2010/main" val="0"/>
@@ -3118,9 +3122,9 @@
           </a:stretch>
         </p:blipFill>
         <p:spPr>
-          <a:xfrm rot="16200000">
-            <a:off x="-2482606" y="2778028"/>
-            <a:ext cx="6267158" cy="1301945"/>
+          <a:xfrm>
+            <a:off x="2371061" y="115593"/>
+            <a:ext cx="4401877" cy="914450"/>
           </a:xfrm>
           <a:prstGeom prst="rect">
             <a:avLst/>
@@ -3220,7 +3224,7 @@
               <a:buNone/>
             </a:pPr>
             <a:r>
-              <a:rPr lang="en-US" sz="16600" dirty="0" smtClean="0">
+              <a:rPr lang="en-US" sz="13800" dirty="0">
                 <a:solidFill>
                   <a:srgbClr val="00B050"/>
                 </a:solidFill>
@@ -3228,19 +3232,19 @@
               <a:t>✔</a:t>
             </a:r>
             <a:r>
-              <a:rPr lang="en-US" sz="16600" dirty="0" smtClean="0"/>
+              <a:rPr lang="en-US" sz="13800" dirty="0"/>
               <a:t> </a:t>
             </a:r>
             <a:r>
-              <a:rPr lang="en-US" sz="16600" dirty="0" err="1" smtClean="0"/>
+              <a:rPr lang="en-US" sz="13800" dirty="0" err="1"/>
               <a:t>ou</a:t>
             </a:r>
             <a:r>
-              <a:rPr lang="en-US" sz="16600" dirty="0" smtClean="0"/>
+              <a:rPr lang="en-US" sz="13800" dirty="0"/>
               <a:t> </a:t>
             </a:r>
             <a:r>
-              <a:rPr lang="en-US" sz="16600" dirty="0" smtClean="0">
+              <a:rPr lang="en-US" sz="13800" dirty="0">
                 <a:solidFill>
                   <a:srgbClr val="C00000"/>
                 </a:solidFill>
@@ -3248,10 +3252,10 @@
               <a:t>✘</a:t>
             </a:r>
             <a:r>
-              <a:rPr lang="en-US" sz="16600" dirty="0" smtClean="0"/>
+              <a:rPr lang="en-US" sz="13800" dirty="0"/>
               <a:t> ?</a:t>
             </a:r>
-            <a:endParaRPr lang="en-US" sz="16600" dirty="0"/>
+            <a:endParaRPr lang="en-US" sz="13800" dirty="0"/>
           </a:p>
         </p:txBody>
       </p:sp>
@@ -3277,7 +3281,7 @@
         </p:blipFill>
         <p:spPr>
           <a:xfrm>
-            <a:off x="4166273" y="5842505"/>
+            <a:off x="2642273" y="5842505"/>
             <a:ext cx="3859454" cy="984138"/>
           </a:xfrm>
           <a:prstGeom prst="rect">
@@ -3308,7 +3312,7 @@
 <file path=ppt/theme/theme1.xml><?xml version="1.0" encoding="utf-8"?>
 <a:theme xmlns:a="http://schemas.openxmlformats.org/drawingml/2006/main" name="Office Theme">
   <a:themeElements>
-    <a:clrScheme name="Office">
+    <a:clrScheme name="Office Theme">
       <a:dk1>
         <a:sysClr val="windowText" lastClr="000000"/>
       </a:dk1>
@@ -3346,7 +3350,7 @@
         <a:srgbClr val="954F72"/>
       </a:folHlink>
     </a:clrScheme>
-    <a:fontScheme name="Office">
+    <a:fontScheme name="Office Theme">
       <a:majorFont>
         <a:latin typeface="Calibri Light" panose="020F0302020204030204"/>
         <a:ea typeface=""/>
@@ -3418,7 +3422,7 @@
         <a:font script="Geor" typeface="Sylfaen"/>
       </a:minorFont>
     </a:fontScheme>
-    <a:fmtScheme name="Office">
+    <a:fmtScheme name="Office Theme">
       <a:fillStyleLst>
         <a:solidFill>
           <a:schemeClr val="phClr"/>

</xml_diff>